<commit_message>
Fehlende "sudo" Befehle hinzugefügt (Folie 20, 29)
</commit_message>
<xml_diff>
--- a/Präsentationen/Bash.pptx
+++ b/Präsentationen/Bash.pptx
@@ -339,7 +339,7 @@
                   <a:schemeClr val="tx2"/>
                 </a:solidFill>
               </a:rPr>
-              <a:t>07.02.2018</a:t>
+              <a:t>26.03.2018</a:t>
             </a:fld>
             <a:endParaRPr lang="de-DE">
               <a:solidFill>
@@ -689,7 +689,7 @@
             <a:fld id="{B4113CCE-1A1A-46DB-884A-AE560F65C3AF}" type="datetimeFigureOut">
               <a:rPr lang="de-DE" smtClean="0"/>
               <a:pPr/>
-              <a:t>07.02.2018</a:t>
+              <a:t>26.03.2018</a:t>
             </a:fld>
             <a:endParaRPr lang="de-DE"/>
           </a:p>
@@ -8631,7 +8631,12 @@
             <p:ph type="sldImg"/>
           </p:nvPr>
         </p:nvSpPr>
-        <p:spPr/>
+        <p:spPr>
+          <a:xfrm>
+            <a:off x="685800" y="1143000"/>
+            <a:ext cx="4270375" cy="2401888"/>
+          </a:xfrm>
+        </p:spPr>
       </p:sp>
       <p:sp>
         <p:nvSpPr>
@@ -14699,7 +14704,7 @@
           <a:p>
             <a:fld id="{366C6F3F-2459-4D70-9926-FB42BF728FA6}" type="datetime1">
               <a:rPr lang="de-DE" smtClean="0"/>
-              <a:t>07.02.2018</a:t>
+              <a:t>26.03.2018</a:t>
             </a:fld>
             <a:endParaRPr lang="de-DE"/>
           </a:p>
@@ -14832,7 +14837,7 @@
           <a:p>
             <a:fld id="{8EB94C85-1664-4A48-98AC-8DF753D25A29}" type="datetime1">
               <a:rPr lang="de-DE" smtClean="0"/>
-              <a:t>07.02.2018</a:t>
+              <a:t>26.03.2018</a:t>
             </a:fld>
             <a:endParaRPr lang="de-DE"/>
           </a:p>
@@ -14973,7 +14978,7 @@
           <a:p>
             <a:fld id="{691FC979-3F94-4691-BC89-32D13FC7EBCE}" type="datetime1">
               <a:rPr lang="de-DE" smtClean="0"/>
-              <a:t>07.02.2018</a:t>
+              <a:t>26.03.2018</a:t>
             </a:fld>
             <a:endParaRPr lang="de-DE"/>
           </a:p>
@@ -15354,7 +15359,7 @@
           <a:p>
             <a:fld id="{CBC55DA8-7BFB-46FD-BBA5-A6DF63369D11}" type="datetime1">
               <a:rPr lang="de-DE" smtClean="0"/>
-              <a:t>07.02.2018</a:t>
+              <a:t>26.03.2018</a:t>
             </a:fld>
             <a:endParaRPr lang="de-DE"/>
           </a:p>
@@ -15545,7 +15550,7 @@
           <a:p>
             <a:fld id="{08AC7274-303B-40A0-A9B4-04FCC19861B5}" type="datetime1">
               <a:rPr lang="de-DE" smtClean="0"/>
-              <a:t>07.02.2018</a:t>
+              <a:t>26.03.2018</a:t>
             </a:fld>
             <a:endParaRPr lang="de-DE"/>
           </a:p>
@@ -15674,7 +15679,7 @@
           <a:p>
             <a:fld id="{04273802-5659-48BC-9FAF-5DEA6D19D2B7}" type="datetime1">
               <a:rPr lang="de-DE" smtClean="0"/>
-              <a:t>07.02.2018</a:t>
+              <a:t>26.03.2018</a:t>
             </a:fld>
             <a:endParaRPr lang="de-DE"/>
           </a:p>
@@ -15780,7 +15785,7 @@
           <a:p>
             <a:fld id="{A879DCBB-93B0-44A3-BD1F-0C3535CA8699}" type="datetime1">
               <a:rPr lang="de-DE" smtClean="0"/>
-              <a:t>07.02.2018</a:t>
+              <a:t>26.03.2018</a:t>
             </a:fld>
             <a:endParaRPr lang="de-DE"/>
           </a:p>
@@ -15913,7 +15918,7 @@
           <a:p>
             <a:fld id="{D6ACE559-FDBB-41B1-8D4B-DC9AA86538CE}" type="datetime1">
               <a:rPr lang="de-DE" smtClean="0"/>
-              <a:t>07.02.2018</a:t>
+              <a:t>26.03.2018</a:t>
             </a:fld>
             <a:endParaRPr lang="de-DE"/>
           </a:p>
@@ -16070,7 +16075,7 @@
           <a:p>
             <a:fld id="{A17D5A13-5CB3-48F6-94E4-1D24B0CCAADA}" type="datetime1">
               <a:rPr lang="de-DE" smtClean="0"/>
-              <a:t>07.02.2018</a:t>
+              <a:t>26.03.2018</a:t>
             </a:fld>
             <a:endParaRPr lang="de-DE"/>
           </a:p>
@@ -16279,7 +16284,7 @@
           <a:p>
             <a:fld id="{7FDE578D-883C-4F1A-917B-4C2253C6F4AE}" type="datetime1">
               <a:rPr lang="de-DE" smtClean="0"/>
-              <a:t>07.02.2018</a:t>
+              <a:t>26.03.2018</a:t>
             </a:fld>
             <a:endParaRPr lang="de-DE"/>
           </a:p>
@@ -16488,7 +16493,7 @@
           <a:p>
             <a:fld id="{37592AC1-A45D-4C86-A646-7D7AA3CA8F0F}" type="datetime1">
               <a:rPr lang="de-DE" smtClean="0"/>
-              <a:t>07.02.2018</a:t>
+              <a:t>26.03.2018</a:t>
             </a:fld>
             <a:endParaRPr lang="de-DE"/>
           </a:p>
@@ -16913,7 +16918,7 @@
           <a:p>
             <a:fld id="{6EF8A41A-F013-46F9-A1B7-9C788DB16844}" type="datetime1">
               <a:rPr lang="de-DE" smtClean="0"/>
-              <a:t>07.02.2018</a:t>
+              <a:t>26.03.2018</a:t>
             </a:fld>
             <a:endParaRPr lang="de-DE" dirty="0"/>
           </a:p>
@@ -17497,7 +17502,7 @@
           <a:p>
             <a:fld id="{F6A23D30-8385-4740-BFA9-93717CB1115D}" type="datetime1">
               <a:rPr lang="de-DE" smtClean="0"/>
-              <a:t>07.02.2018</a:t>
+              <a:t>26.03.2018</a:t>
             </a:fld>
             <a:endParaRPr lang="de-DE" dirty="0"/>
           </a:p>
@@ -18141,7 +18146,7 @@
           <a:p>
             <a:fld id="{DEAE0D00-77B9-479C-AA25-1CC77788EEA5}" type="datetime1">
               <a:rPr lang="de-DE" smtClean="0"/>
-              <a:t>07.02.2018</a:t>
+              <a:t>26.03.2018</a:t>
             </a:fld>
             <a:endParaRPr lang="de-DE"/>
           </a:p>
@@ -18247,7 +18252,7 @@
           <a:p>
             <a:fld id="{691FC979-3F94-4691-BC89-32D13FC7EBCE}" type="datetime1">
               <a:rPr lang="de-DE" smtClean="0"/>
-              <a:t>07.02.2018</a:t>
+              <a:t>26.03.2018</a:t>
             </a:fld>
             <a:endParaRPr lang="de-DE"/>
           </a:p>
@@ -18499,7 +18504,7 @@
           <a:p>
             <a:fld id="{691FC979-3F94-4691-BC89-32D13FC7EBCE}" type="datetime1">
               <a:rPr lang="de-DE" smtClean="0"/>
-              <a:t>07.02.2018</a:t>
+              <a:t>26.03.2018</a:t>
             </a:fld>
             <a:endParaRPr lang="de-DE"/>
           </a:p>
@@ -18690,7 +18695,7 @@
           <a:p>
             <a:fld id="{691FC979-3F94-4691-BC89-32D13FC7EBCE}" type="datetime1">
               <a:rPr lang="de-DE" smtClean="0"/>
-              <a:t>07.02.2018</a:t>
+              <a:t>26.03.2018</a:t>
             </a:fld>
             <a:endParaRPr lang="de-DE"/>
           </a:p>
@@ -18887,7 +18892,7 @@
           <a:p>
             <a:fld id="{691FC979-3F94-4691-BC89-32D13FC7EBCE}" type="datetime1">
               <a:rPr lang="de-DE" smtClean="0"/>
-              <a:t>07.02.2018</a:t>
+              <a:t>26.03.2018</a:t>
             </a:fld>
             <a:endParaRPr lang="de-DE"/>
           </a:p>
@@ -19184,7 +19189,7 @@
           <a:p>
             <a:fld id="{691FC979-3F94-4691-BC89-32D13FC7EBCE}" type="datetime1">
               <a:rPr lang="de-DE" smtClean="0"/>
-              <a:t>07.02.2018</a:t>
+              <a:t>26.03.2018</a:t>
             </a:fld>
             <a:endParaRPr lang="de-DE"/>
           </a:p>
@@ -19445,7 +19450,7 @@
           <a:p>
             <a:fld id="{691FC979-3F94-4691-BC89-32D13FC7EBCE}" type="datetime1">
               <a:rPr lang="de-DE" smtClean="0"/>
-              <a:t>07.02.2018</a:t>
+              <a:t>26.03.2018</a:t>
             </a:fld>
             <a:endParaRPr lang="de-DE"/>
           </a:p>
@@ -19775,7 +19780,7 @@
           <a:p>
             <a:fld id="{CBC55DA8-7BFB-46FD-BBA5-A6DF63369D11}" type="datetime1">
               <a:rPr lang="de-DE" smtClean="0"/>
-              <a:t>07.02.2018</a:t>
+              <a:t>26.03.2018</a:t>
             </a:fld>
             <a:endParaRPr lang="de-DE"/>
           </a:p>
@@ -20100,7 +20105,7 @@
           <a:p>
             <a:fld id="{CBC55DA8-7BFB-46FD-BBA5-A6DF63369D11}" type="datetime1">
               <a:rPr lang="de-DE" smtClean="0"/>
-              <a:t>07.02.2018</a:t>
+              <a:t>26.03.2018</a:t>
             </a:fld>
             <a:endParaRPr lang="de-DE"/>
           </a:p>
@@ -20206,7 +20211,7 @@
           <a:p>
             <a:fld id="{CBC55DA8-7BFB-46FD-BBA5-A6DF63369D11}" type="datetime1">
               <a:rPr lang="de-DE" smtClean="0"/>
-              <a:t>07.02.2018</a:t>
+              <a:t>26.03.2018</a:t>
             </a:fld>
             <a:endParaRPr lang="de-DE"/>
           </a:p>
@@ -20860,7 +20865,7 @@
           <a:p>
             <a:fld id="{691FC979-3F94-4691-BC89-32D13FC7EBCE}" type="datetime1">
               <a:rPr lang="de-DE" smtClean="0"/>
-              <a:t>07.02.2018</a:t>
+              <a:t>26.03.2018</a:t>
             </a:fld>
             <a:endParaRPr lang="de-DE"/>
           </a:p>
@@ -21036,7 +21041,6 @@
               <a:rPr lang="de-DE" dirty="0" smtClean="0"/>
               <a:t>Dateirechte</a:t>
             </a:r>
-            <a:endParaRPr lang="de-DE" dirty="0" smtClean="0"/>
           </a:p>
         </p:txBody>
       </p:sp>
@@ -21057,7 +21061,7 @@
           <a:p>
             <a:fld id="{7CAB622F-8E15-4AA7-B23D-2D3C823960FD}" type="datetime1">
               <a:rPr lang="de-DE" smtClean="0"/>
-              <a:t>07.02.2018</a:t>
+              <a:t>26.03.2018</a:t>
             </a:fld>
             <a:endParaRPr lang="de-DE"/>
           </a:p>
@@ -21171,7 +21175,7 @@
           <a:p>
             <a:fld id="{08AC7274-303B-40A0-A9B4-04FCC19861B5}" type="datetime1">
               <a:rPr lang="de-DE" smtClean="0"/>
-              <a:t>07.02.2018</a:t>
+              <a:t>26.03.2018</a:t>
             </a:fld>
             <a:endParaRPr lang="de-DE"/>
           </a:p>
@@ -21276,16 +21280,34 @@
           </a:p>
           <a:p>
             <a:r>
-              <a:rPr lang="de-DE" sz="2400" dirty="0" err="1">
+              <a:rPr lang="de-DE" sz="2400" dirty="0" err="1" smtClean="0">
                 <a:solidFill>
                   <a:srgbClr val="00B050"/>
                 </a:solidFill>
                 <a:latin typeface="Consolas" panose="020B0609020204030204" pitchFamily="49" charset="0"/>
               </a:rPr>
+              <a:t>sudo</a:t>
+            </a:r>
+            <a:r>
+              <a:rPr lang="de-DE" sz="2400" dirty="0" smtClean="0">
+                <a:solidFill>
+                  <a:srgbClr val="00B050"/>
+                </a:solidFill>
+                <a:latin typeface="Consolas" panose="020B0609020204030204" pitchFamily="49" charset="0"/>
+              </a:rPr>
+              <a:t> </a:t>
+            </a:r>
+            <a:r>
+              <a:rPr lang="de-DE" sz="2400" dirty="0" err="1" smtClean="0">
+                <a:solidFill>
+                  <a:srgbClr val="00B050"/>
+                </a:solidFill>
+                <a:latin typeface="Consolas" panose="020B0609020204030204" pitchFamily="49" charset="0"/>
+              </a:rPr>
               <a:t>chown</a:t>
             </a:r>
             <a:r>
-              <a:rPr lang="de-DE" sz="2400" dirty="0">
+              <a:rPr lang="de-DE" sz="2400" dirty="0" smtClean="0">
                 <a:solidFill>
                   <a:srgbClr val="00B050"/>
                 </a:solidFill>
@@ -21349,16 +21371,34 @@
           </a:p>
           <a:p>
             <a:r>
-              <a:rPr lang="de-DE" sz="2400" dirty="0" err="1">
+              <a:rPr lang="de-DE" sz="2400" dirty="0" err="1" smtClean="0">
                 <a:solidFill>
                   <a:srgbClr val="00B050"/>
                 </a:solidFill>
                 <a:latin typeface="Consolas" panose="020B0609020204030204" pitchFamily="49" charset="0"/>
               </a:rPr>
+              <a:t>sudo</a:t>
+            </a:r>
+            <a:r>
+              <a:rPr lang="de-DE" sz="2400" dirty="0" smtClean="0">
+                <a:solidFill>
+                  <a:srgbClr val="00B050"/>
+                </a:solidFill>
+                <a:latin typeface="Consolas" panose="020B0609020204030204" pitchFamily="49" charset="0"/>
+              </a:rPr>
+              <a:t> </a:t>
+            </a:r>
+            <a:r>
+              <a:rPr lang="de-DE" sz="2400" dirty="0" err="1" smtClean="0">
+                <a:solidFill>
+                  <a:srgbClr val="00B050"/>
+                </a:solidFill>
+                <a:latin typeface="Consolas" panose="020B0609020204030204" pitchFamily="49" charset="0"/>
+              </a:rPr>
               <a:t>chgrp</a:t>
             </a:r>
             <a:r>
-              <a:rPr lang="de-DE" sz="2400" dirty="0">
+              <a:rPr lang="de-DE" sz="2400" dirty="0" smtClean="0">
                 <a:solidFill>
                   <a:srgbClr val="00B050"/>
                 </a:solidFill>
@@ -21505,7 +21545,7 @@
           <a:p>
             <a:fld id="{691FC979-3F94-4691-BC89-32D13FC7EBCE}" type="datetime1">
               <a:rPr lang="de-DE" smtClean="0"/>
-              <a:t>07.02.2018</a:t>
+              <a:t>26.03.2018</a:t>
             </a:fld>
             <a:endParaRPr lang="de-DE"/>
           </a:p>
@@ -21972,7 +22012,7 @@
           <a:p>
             <a:fld id="{691FC979-3F94-4691-BC89-32D13FC7EBCE}" type="datetime1">
               <a:rPr lang="de-DE" smtClean="0"/>
-              <a:t>07.02.2018</a:t>
+              <a:t>26.03.2018</a:t>
             </a:fld>
             <a:endParaRPr lang="de-DE"/>
           </a:p>
@@ -22137,7 +22177,7 @@
           <a:p>
             <a:fld id="{08AC7274-303B-40A0-A9B4-04FCC19861B5}" type="datetime1">
               <a:rPr lang="de-DE" smtClean="0"/>
-              <a:t>07.02.2018</a:t>
+              <a:t>26.03.2018</a:t>
             </a:fld>
             <a:endParaRPr lang="de-DE"/>
           </a:p>
@@ -22426,7 +22466,7 @@
           <a:p>
             <a:fld id="{691FC979-3F94-4691-BC89-32D13FC7EBCE}" type="datetime1">
               <a:rPr lang="de-DE" smtClean="0"/>
-              <a:t>07.02.2018</a:t>
+              <a:t>26.03.2018</a:t>
             </a:fld>
             <a:endParaRPr lang="de-DE"/>
           </a:p>
@@ -22546,12 +22586,6 @@
               </a:rPr>
               <a:t> &lt;Variable&gt;=$&lt;Variable&gt;+$&lt;Variable&gt;</a:t>
             </a:r>
-            <a:endParaRPr lang="de-DE" sz="2400" dirty="0">
-              <a:solidFill>
-                <a:srgbClr val="00B050"/>
-              </a:solidFill>
-              <a:latin typeface="Consolas" panose="020B0609020204030204" pitchFamily="49" charset="0"/>
-            </a:endParaRPr>
           </a:p>
         </p:txBody>
       </p:sp>
@@ -22632,7 +22666,7 @@
           <a:p>
             <a:fld id="{691FC979-3F94-4691-BC89-32D13FC7EBCE}" type="datetime1">
               <a:rPr lang="de-DE" smtClean="0"/>
-              <a:t>07.02.2018</a:t>
+              <a:t>26.03.2018</a:t>
             </a:fld>
             <a:endParaRPr lang="de-DE"/>
           </a:p>
@@ -22714,16 +22748,7 @@
                 </a:solidFill>
                 <a:latin typeface="Consolas" panose="020B0609020204030204" pitchFamily="49" charset="0"/>
               </a:rPr>
-              <a:t>$</a:t>
-            </a:r>
-            <a:r>
-              <a:rPr lang="de-DE" dirty="0">
-                <a:solidFill>
-                  <a:srgbClr val="00B050"/>
-                </a:solidFill>
-                <a:latin typeface="Consolas" panose="020B0609020204030204" pitchFamily="49" charset="0"/>
-              </a:rPr>
-              <a:t>HOME</a:t>
+              <a:t>$HOME</a:t>
             </a:r>
           </a:p>
           <a:p>
@@ -22874,7 +22899,7 @@
           <a:p>
             <a:fld id="{691FC979-3F94-4691-BC89-32D13FC7EBCE}" type="datetime1">
               <a:rPr lang="de-DE" smtClean="0"/>
-              <a:t>07.02.2018</a:t>
+              <a:t>26.03.2018</a:t>
             </a:fld>
             <a:endParaRPr lang="de-DE"/>
           </a:p>
@@ -23028,16 +23053,7 @@
                 </a:solidFill>
                 <a:latin typeface="Consolas" panose="020B0609020204030204" pitchFamily="49" charset="0"/>
               </a:rPr>
-              <a:t> </a:t>
-            </a:r>
-            <a:r>
-              <a:rPr lang="de-DE" sz="2400" dirty="0">
-                <a:solidFill>
-                  <a:srgbClr val="00B050"/>
-                </a:solidFill>
-                <a:latin typeface="Consolas" panose="020B0609020204030204" pitchFamily="49" charset="0"/>
-              </a:rPr>
-              <a:t>&lt;Datei</a:t>
+              <a:t> &lt;Datei</a:t>
             </a:r>
             <a:r>
               <a:rPr lang="de-DE" sz="2400" dirty="0" smtClean="0">
@@ -23289,7 +23305,7 @@
           <a:p>
             <a:fld id="{691FC979-3F94-4691-BC89-32D13FC7EBCE}" type="datetime1">
               <a:rPr lang="de-DE" smtClean="0"/>
-              <a:t>07.02.2018</a:t>
+              <a:t>26.03.2018</a:t>
             </a:fld>
             <a:endParaRPr lang="de-DE"/>
           </a:p>
@@ -23440,12 +23456,6 @@
               </a:rPr>
               <a:t>Programm&gt; | &lt;Programm&gt;</a:t>
             </a:r>
-            <a:endParaRPr lang="de-DE" sz="2400" dirty="0">
-              <a:solidFill>
-                <a:srgbClr val="00B050"/>
-              </a:solidFill>
-              <a:latin typeface="Consolas" panose="020B0609020204030204" pitchFamily="49" charset="0"/>
-            </a:endParaRPr>
           </a:p>
         </p:txBody>
       </p:sp>
@@ -23526,7 +23536,7 @@
           <a:p>
             <a:fld id="{691FC979-3F94-4691-BC89-32D13FC7EBCE}" type="datetime1">
               <a:rPr lang="de-DE" smtClean="0"/>
-              <a:t>07.02.2018</a:t>
+              <a:t>26.03.2018</a:t>
             </a:fld>
             <a:endParaRPr lang="de-DE"/>
           </a:p>
@@ -23798,7 +23808,7 @@
           <a:p>
             <a:fld id="{691FC979-3F94-4691-BC89-32D13FC7EBCE}" type="datetime1">
               <a:rPr lang="de-DE" smtClean="0"/>
-              <a:t>07.02.2018</a:t>
+              <a:t>26.03.2018</a:t>
             </a:fld>
             <a:endParaRPr lang="de-DE"/>
           </a:p>
@@ -23871,7 +23881,25 @@
               <a:t>Als Admin arbeiten: </a:t>
             </a:r>
             <a:r>
-              <a:rPr lang="de-DE" sz="2400" dirty="0" err="1">
+              <a:rPr lang="de-DE" sz="2400" dirty="0" err="1" smtClean="0">
+                <a:solidFill>
+                  <a:srgbClr val="00B050"/>
+                </a:solidFill>
+                <a:latin typeface="Consolas" panose="020B0609020204030204" pitchFamily="49" charset="0"/>
+              </a:rPr>
+              <a:t>sudo</a:t>
+            </a:r>
+            <a:r>
+              <a:rPr lang="de-DE" sz="2400" dirty="0" smtClean="0">
+                <a:solidFill>
+                  <a:srgbClr val="00B050"/>
+                </a:solidFill>
+                <a:latin typeface="Consolas" panose="020B0609020204030204" pitchFamily="49" charset="0"/>
+              </a:rPr>
+              <a:t> </a:t>
+            </a:r>
+            <a:r>
+              <a:rPr lang="de-DE" sz="2400" dirty="0" err="1" smtClean="0">
                 <a:solidFill>
                   <a:srgbClr val="00B050"/>
                 </a:solidFill>
@@ -24119,7 +24147,7 @@
           <a:p>
             <a:fld id="{7CAB622F-8E15-4AA7-B23D-2D3C823960FD}" type="datetime1">
               <a:rPr lang="de-DE" smtClean="0"/>
-              <a:t>07.02.2018</a:t>
+              <a:t>26.03.2018</a:t>
             </a:fld>
             <a:endParaRPr lang="de-DE"/>
           </a:p>
@@ -24233,7 +24261,7 @@
           <a:p>
             <a:fld id="{691FC979-3F94-4691-BC89-32D13FC7EBCE}" type="datetime1">
               <a:rPr lang="de-DE" smtClean="0"/>
-              <a:t>07.02.2018</a:t>
+              <a:t>26.03.2018</a:t>
             </a:fld>
             <a:endParaRPr lang="de-DE"/>
           </a:p>
@@ -24409,7 +24437,7 @@
           <a:p>
             <a:fld id="{691FC979-3F94-4691-BC89-32D13FC7EBCE}" type="datetime1">
               <a:rPr lang="de-DE" smtClean="0"/>
-              <a:t>07.02.2018</a:t>
+              <a:t>26.03.2018</a:t>
             </a:fld>
             <a:endParaRPr lang="de-DE"/>
           </a:p>
@@ -24538,12 +24566,6 @@
               </a:rPr>
               <a:t> &lt;Befehl&gt;</a:t>
             </a:r>
-            <a:endParaRPr lang="de-DE" sz="2400" dirty="0">
-              <a:solidFill>
-                <a:srgbClr val="00B050"/>
-              </a:solidFill>
-              <a:latin typeface="Consolas" panose="020B0609020204030204" pitchFamily="49" charset="0"/>
-            </a:endParaRPr>
           </a:p>
         </p:txBody>
       </p:sp>
@@ -24854,7 +24876,7 @@
           <a:p>
             <a:fld id="{81CAA568-E4AD-43EC-8F2A-0AD1F2EE9220}" type="datetime1">
               <a:rPr lang="de-DE" smtClean="0"/>
-              <a:t>07.02.2018</a:t>
+              <a:t>26.03.2018</a:t>
             </a:fld>
             <a:endParaRPr lang="de-DE"/>
           </a:p>
@@ -24916,11 +24938,11 @@
   <p:clrMapOvr>
     <a:masterClrMapping/>
   </p:clrMapOvr>
-  <mc:AlternateContent xmlns:mc="http://schemas.openxmlformats.org/markup-compatibility/2006">
-    <mc:Choice xmlns:p14="http://schemas.microsoft.com/office/powerpoint/2010/main" Requires="p14">
+  <mc:AlternateContent xmlns:mc="http://schemas.openxmlformats.org/markup-compatibility/2006" xmlns:p14="http://schemas.microsoft.com/office/powerpoint/2010/main">
+    <mc:Choice Requires="p14">
       <p:transition spd="slow" p14:dur="2000"/>
     </mc:Choice>
-    <mc:Fallback>
+    <mc:Fallback xmlns="">
       <p:transition spd="slow"/>
     </mc:Fallback>
   </mc:AlternateContent>
@@ -25250,7 +25272,7 @@
           <a:p>
             <a:fld id="{81CAA568-E4AD-43EC-8F2A-0AD1F2EE9220}" type="datetime1">
               <a:rPr lang="de-DE" smtClean="0"/>
-              <a:t>07.02.2018</a:t>
+              <a:t>26.03.2018</a:t>
             </a:fld>
             <a:endParaRPr lang="de-DE"/>
           </a:p>
@@ -25312,11 +25334,11 @@
   <p:clrMapOvr>
     <a:masterClrMapping/>
   </p:clrMapOvr>
-  <mc:AlternateContent xmlns:mc="http://schemas.openxmlformats.org/markup-compatibility/2006">
-    <mc:Choice xmlns:p14="http://schemas.microsoft.com/office/powerpoint/2010/main" Requires="p14">
+  <mc:AlternateContent xmlns:mc="http://schemas.openxmlformats.org/markup-compatibility/2006" xmlns:p14="http://schemas.microsoft.com/office/powerpoint/2010/main">
+    <mc:Choice Requires="p14">
       <p:transition spd="slow" p14:dur="2000"/>
     </mc:Choice>
-    <mc:Fallback>
+    <mc:Fallback xmlns="">
       <p:transition spd="slow"/>
     </mc:Fallback>
   </mc:AlternateContent>
@@ -25452,6 +25474,59 @@
               </a:rPr>
               <a:t>$x</a:t>
             </a:r>
+          </a:p>
+          <a:p>
+            <a:r>
+              <a:rPr lang="de-DE" dirty="0" smtClean="0"/>
+              <a:t>Umleitungen</a:t>
+            </a:r>
+          </a:p>
+          <a:p>
+            <a:pPr lvl="1"/>
+            <a:r>
+              <a:rPr lang="de-DE" dirty="0">
+                <a:solidFill>
+                  <a:srgbClr val="00B050"/>
+                </a:solidFill>
+                <a:latin typeface="Consolas" panose="020B0609020204030204" pitchFamily="49" charset="0"/>
+              </a:rPr>
+              <a:t>&gt;</a:t>
+            </a:r>
+            <a:r>
+              <a:rPr lang="de-DE" dirty="0" smtClean="0"/>
+              <a:t>, </a:t>
+            </a:r>
+            <a:r>
+              <a:rPr lang="de-DE" dirty="0" smtClean="0">
+                <a:solidFill>
+                  <a:srgbClr val="00B050"/>
+                </a:solidFill>
+                <a:latin typeface="Consolas" panose="020B0609020204030204" pitchFamily="49" charset="0"/>
+              </a:rPr>
+              <a:t>&gt;&gt;</a:t>
+            </a:r>
+            <a:r>
+              <a:rPr lang="de-DE" dirty="0"/>
+              <a:t>, </a:t>
+            </a:r>
+            <a:r>
+              <a:rPr lang="de-DE" dirty="0">
+                <a:solidFill>
+                  <a:srgbClr val="00B050"/>
+                </a:solidFill>
+                <a:latin typeface="Consolas" panose="020B0609020204030204" pitchFamily="49" charset="0"/>
+              </a:rPr>
+              <a:t>2</a:t>
+            </a:r>
+            <a:r>
+              <a:rPr lang="de-DE" dirty="0" smtClean="0">
+                <a:solidFill>
+                  <a:srgbClr val="00B050"/>
+                </a:solidFill>
+                <a:latin typeface="Consolas" panose="020B0609020204030204" pitchFamily="49" charset="0"/>
+              </a:rPr>
+              <a:t>&gt;</a:t>
+            </a:r>
             <a:endParaRPr lang="de-DE" dirty="0">
               <a:solidFill>
                 <a:srgbClr val="00B050"/>
@@ -25460,12 +25535,6 @@
             </a:endParaRPr>
           </a:p>
           <a:p>
-            <a:r>
-              <a:rPr lang="de-DE" dirty="0" smtClean="0"/>
-              <a:t>Umleitungen</a:t>
-            </a:r>
-          </a:p>
-          <a:p>
             <a:pPr lvl="1"/>
             <a:r>
               <a:rPr lang="de-DE" dirty="0">
@@ -25474,12 +25543,11 @@
                 </a:solidFill>
                 <a:latin typeface="Consolas" panose="020B0609020204030204" pitchFamily="49" charset="0"/>
               </a:rPr>
-              <a:t>&gt;</a:t>
-            </a:r>
-            <a:r>
-              <a:rPr lang="de-DE" dirty="0" smtClean="0"/>
-              <a:t>, </a:t>
-            </a:r>
+              <a:t>&lt;</a:t>
+            </a:r>
+          </a:p>
+          <a:p>
+            <a:pPr lvl="1"/>
             <a:r>
               <a:rPr lang="de-DE" dirty="0" smtClean="0">
                 <a:solidFill>
@@ -25487,29 +25555,7 @@
                 </a:solidFill>
                 <a:latin typeface="Consolas" panose="020B0609020204030204" pitchFamily="49" charset="0"/>
               </a:rPr>
-              <a:t>&gt;&gt;</a:t>
-            </a:r>
-            <a:r>
-              <a:rPr lang="de-DE" dirty="0"/>
-              <a:t>, </a:t>
-            </a:r>
-            <a:r>
-              <a:rPr lang="de-DE" dirty="0">
-                <a:solidFill>
-                  <a:srgbClr val="00B050"/>
-                </a:solidFill>
-                <a:latin typeface="Consolas" panose="020B0609020204030204" pitchFamily="49" charset="0"/>
-              </a:rPr>
-              <a:t>2</a:t>
-            </a:r>
-            <a:r>
-              <a:rPr lang="de-DE" dirty="0" smtClean="0">
-                <a:solidFill>
-                  <a:srgbClr val="00B050"/>
-                </a:solidFill>
-                <a:latin typeface="Consolas" panose="020B0609020204030204" pitchFamily="49" charset="0"/>
-              </a:rPr>
-              <a:t>&gt;</a:t>
+              <a:t>|</a:t>
             </a:r>
             <a:endParaRPr lang="de-DE" dirty="0">
               <a:solidFill>
@@ -25518,36 +25564,6 @@
               <a:latin typeface="Consolas" panose="020B0609020204030204" pitchFamily="49" charset="0"/>
             </a:endParaRPr>
           </a:p>
-          <a:p>
-            <a:pPr lvl="1"/>
-            <a:r>
-              <a:rPr lang="de-DE" dirty="0">
-                <a:solidFill>
-                  <a:srgbClr val="00B050"/>
-                </a:solidFill>
-                <a:latin typeface="Consolas" panose="020B0609020204030204" pitchFamily="49" charset="0"/>
-              </a:rPr>
-              <a:t>&lt;</a:t>
-            </a:r>
-          </a:p>
-          <a:p>
-            <a:pPr lvl="1"/>
-            <a:r>
-              <a:rPr lang="de-DE" dirty="0" smtClean="0">
-                <a:solidFill>
-                  <a:srgbClr val="00B050"/>
-                </a:solidFill>
-                <a:latin typeface="Consolas" panose="020B0609020204030204" pitchFamily="49" charset="0"/>
-              </a:rPr>
-              <a:t>|</a:t>
-            </a:r>
-            <a:endParaRPr lang="de-DE" dirty="0">
-              <a:solidFill>
-                <a:srgbClr val="00B050"/>
-              </a:solidFill>
-              <a:latin typeface="Consolas" panose="020B0609020204030204" pitchFamily="49" charset="0"/>
-            </a:endParaRPr>
-          </a:p>
         </p:txBody>
       </p:sp>
       <p:sp>
@@ -25567,7 +25583,7 @@
           <a:p>
             <a:fld id="{81CAA568-E4AD-43EC-8F2A-0AD1F2EE9220}" type="datetime1">
               <a:rPr lang="de-DE" smtClean="0"/>
-              <a:t>07.02.2018</a:t>
+              <a:t>26.03.2018</a:t>
             </a:fld>
             <a:endParaRPr lang="de-DE"/>
           </a:p>
@@ -25629,11 +25645,11 @@
   <p:clrMapOvr>
     <a:masterClrMapping/>
   </p:clrMapOvr>
-  <mc:AlternateContent xmlns:mc="http://schemas.openxmlformats.org/markup-compatibility/2006">
-    <mc:Choice xmlns:p14="http://schemas.microsoft.com/office/powerpoint/2010/main" Requires="p14">
+  <mc:AlternateContent xmlns:mc="http://schemas.openxmlformats.org/markup-compatibility/2006" xmlns:p14="http://schemas.microsoft.com/office/powerpoint/2010/main">
+    <mc:Choice Requires="p14">
       <p:transition spd="slow" p14:dur="2000"/>
     </mc:Choice>
-    <mc:Fallback>
+    <mc:Fallback xmlns="">
       <p:transition spd="slow"/>
     </mc:Fallback>
   </mc:AlternateContent>
@@ -25768,16 +25784,7 @@
                 </a:solidFill>
                 <a:latin typeface="Consolas" panose="020B0609020204030204" pitchFamily="49" charset="0"/>
               </a:rPr>
-              <a:t>s</a:t>
-            </a:r>
-            <a:r>
-              <a:rPr lang="de-DE" dirty="0" err="1">
-                <a:solidFill>
-                  <a:srgbClr val="00B050"/>
-                </a:solidFill>
-                <a:latin typeface="Consolas" panose="020B0609020204030204" pitchFamily="49" charset="0"/>
-              </a:rPr>
-              <a:t>u</a:t>
+              <a:t>su</a:t>
             </a:r>
             <a:endParaRPr lang="de-DE" dirty="0">
               <a:solidFill>
@@ -25877,7 +25884,7 @@
           <a:p>
             <a:fld id="{81CAA568-E4AD-43EC-8F2A-0AD1F2EE9220}" type="datetime1">
               <a:rPr lang="de-DE" smtClean="0"/>
-              <a:t>07.02.2018</a:t>
+              <a:t>26.03.2018</a:t>
             </a:fld>
             <a:endParaRPr lang="de-DE"/>
           </a:p>
@@ -25939,11 +25946,11 @@
   <p:clrMapOvr>
     <a:masterClrMapping/>
   </p:clrMapOvr>
-  <mc:AlternateContent xmlns:mc="http://schemas.openxmlformats.org/markup-compatibility/2006">
-    <mc:Choice xmlns:p14="http://schemas.microsoft.com/office/powerpoint/2010/main" Requires="p14">
+  <mc:AlternateContent xmlns:mc="http://schemas.openxmlformats.org/markup-compatibility/2006" xmlns:p14="http://schemas.microsoft.com/office/powerpoint/2010/main">
+    <mc:Choice Requires="p14">
       <p:transition spd="slow" p14:dur="2000"/>
     </mc:Choice>
-    <mc:Fallback>
+    <mc:Fallback xmlns="">
       <p:transition spd="slow"/>
     </mc:Fallback>
   </mc:AlternateContent>
@@ -26038,7 +26045,7 @@
           <a:p>
             <a:fld id="{81F9AF91-D5A7-4DFB-9749-E97FA4AADD5C}" type="datetime1">
               <a:rPr lang="de-DE" smtClean="0"/>
-              <a:t>07.02.2018</a:t>
+              <a:t>26.03.2018</a:t>
             </a:fld>
             <a:endParaRPr lang="de-DE"/>
           </a:p>
@@ -26256,7 +26263,7 @@
           <a:p>
             <a:fld id="{CC6A951E-FE58-4A7B-8560-55DE4235FB0A}" type="datetime1">
               <a:rPr lang="de-DE" smtClean="0"/>
-              <a:t>07.02.2018</a:t>
+              <a:t>26.03.2018</a:t>
             </a:fld>
             <a:endParaRPr lang="de-DE"/>
           </a:p>
@@ -26517,7 +26524,7 @@
           <a:p>
             <a:fld id="{CBC55DA8-7BFB-46FD-BBA5-A6DF63369D11}" type="datetime1">
               <a:rPr lang="de-DE" smtClean="0"/>
-              <a:t>07.02.2018</a:t>
+              <a:t>26.03.2018</a:t>
             </a:fld>
             <a:endParaRPr lang="de-DE"/>
           </a:p>
@@ -26623,7 +26630,7 @@
           <a:p>
             <a:fld id="{CBC55DA8-7BFB-46FD-BBA5-A6DF63369D11}" type="datetime1">
               <a:rPr lang="de-DE" smtClean="0"/>
-              <a:t>07.02.2018</a:t>
+              <a:t>26.03.2018</a:t>
             </a:fld>
             <a:endParaRPr lang="de-DE"/>
           </a:p>
@@ -26934,7 +26941,7 @@
           <a:p>
             <a:fld id="{CBC55DA8-7BFB-46FD-BBA5-A6DF63369D11}" type="datetime1">
               <a:rPr lang="de-DE" smtClean="0"/>
-              <a:t>07.02.2018</a:t>
+              <a:t>26.03.2018</a:t>
             </a:fld>
             <a:endParaRPr lang="de-DE"/>
           </a:p>
@@ -27281,7 +27288,7 @@
           <a:p>
             <a:fld id="{CBC55DA8-7BFB-46FD-BBA5-A6DF63369D11}" type="datetime1">
               <a:rPr lang="de-DE" smtClean="0"/>
-              <a:t>07.02.2018</a:t>
+              <a:t>26.03.2018</a:t>
             </a:fld>
             <a:endParaRPr lang="de-DE"/>
           </a:p>
@@ -27387,7 +27394,7 @@
           <a:p>
             <a:fld id="{CBC55DA8-7BFB-46FD-BBA5-A6DF63369D11}" type="datetime1">
               <a:rPr lang="de-DE" smtClean="0"/>
-              <a:t>07.02.2018</a:t>
+              <a:t>26.03.2018</a:t>
             </a:fld>
             <a:endParaRPr lang="de-DE"/>
           </a:p>

</xml_diff>